<commit_message>
- more contents added
</commit_message>
<xml_diff>
--- a/cw ismir2014/cw_ismir2014_plots.pptx
+++ b/cw ismir2014/cw_ismir2014_plots.pptx
@@ -8,6 +8,7 @@
     <p:sldId id="260" r:id="rId2"/>
     <p:sldId id="261" r:id="rId3"/>
     <p:sldId id="259" r:id="rId4"/>
+    <p:sldId id="262" r:id="rId5"/>
   </p:sldIdLst>
   <p:sldSz cx="9144000" cy="6858000" type="screen4x3"/>
   <p:notesSz cx="6858000" cy="9144000"/>
@@ -3859,6 +3860,56 @@
           <a:chExt cx="0" cy="0"/>
         </a:xfrm>
       </p:grpSpPr>
+      <p:sp>
+        <p:nvSpPr>
+          <p:cNvPr id="50" name="圓角矩形 49"/>
+          <p:cNvSpPr/>
+          <p:nvPr/>
+        </p:nvSpPr>
+        <p:spPr>
+          <a:xfrm>
+            <a:off x="1366682" y="588715"/>
+            <a:ext cx="2471072" cy="3953374"/>
+          </a:xfrm>
+          <a:prstGeom prst="roundRect">
+            <a:avLst/>
+          </a:prstGeom>
+          <a:solidFill>
+            <a:schemeClr val="bg1">
+              <a:lumMod val="85000"/>
+            </a:schemeClr>
+          </a:solidFill>
+          <a:ln>
+            <a:solidFill>
+              <a:schemeClr val="tx1"/>
+            </a:solidFill>
+            <a:prstDash val="dash"/>
+          </a:ln>
+          <a:effectLst/>
+        </p:spPr>
+        <p:style>
+          <a:lnRef idx="1">
+            <a:schemeClr val="accent1"/>
+          </a:lnRef>
+          <a:fillRef idx="3">
+            <a:schemeClr val="accent1"/>
+          </a:fillRef>
+          <a:effectRef idx="2">
+            <a:schemeClr val="accent1"/>
+          </a:effectRef>
+          <a:fontRef idx="minor">
+            <a:schemeClr val="lt1"/>
+          </a:fontRef>
+        </p:style>
+        <p:txBody>
+          <a:bodyPr rtlCol="0" anchor="ctr"/>
+          <a:lstStyle/>
+          <a:p>
+            <a:pPr algn="ctr"/>
+            <a:endParaRPr kumimoji="1" lang="zh-TW" altLang="en-US" dirty="0"/>
+          </a:p>
+        </p:txBody>
+      </p:sp>
       <p:cxnSp>
         <p:nvCxnSpPr>
           <p:cNvPr id="20" name="直線箭頭接點 19"/>
@@ -3867,7 +3918,7 @@
         </p:nvCxnSpPr>
         <p:spPr>
           <a:xfrm>
-            <a:off x="2075270" y="1173490"/>
+            <a:off x="2075270" y="1725730"/>
             <a:ext cx="1074" cy="179472"/>
           </a:xfrm>
           <a:prstGeom prst="straightConnector1">
@@ -3904,7 +3955,7 @@
         </p:nvSpPr>
         <p:spPr>
           <a:xfrm>
-            <a:off x="3941797" y="563952"/>
+            <a:off x="4240256" y="552527"/>
             <a:ext cx="857627" cy="584776"/>
           </a:xfrm>
           <a:prstGeom prst="rect">
@@ -3949,7 +4000,7 @@
         </p:nvSpPr>
         <p:spPr>
           <a:xfrm>
-            <a:off x="2874487" y="4662256"/>
+            <a:off x="2860682" y="4565614"/>
             <a:ext cx="2134619" cy="338554"/>
           </a:xfrm>
           <a:prstGeom prst="rect">
@@ -4030,7 +4081,7 @@
         </p:nvGrpSpPr>
         <p:grpSpPr>
           <a:xfrm>
-            <a:off x="1526783" y="3334325"/>
+            <a:off x="1512978" y="3168653"/>
             <a:ext cx="2175076" cy="450636"/>
             <a:chOff x="4555608" y="1573855"/>
             <a:chExt cx="2257354" cy="607452"/>
@@ -4126,10 +4177,10 @@
         </p:nvGrpSpPr>
         <p:grpSpPr>
           <a:xfrm>
-            <a:off x="1526783" y="1344597"/>
-            <a:ext cx="1090037" cy="318909"/>
-            <a:chOff x="4555608" y="1562462"/>
-            <a:chExt cx="1144631" cy="412235"/>
+            <a:off x="1526782" y="1871004"/>
+            <a:ext cx="2152675" cy="344744"/>
+            <a:chOff x="4555608" y="1529067"/>
+            <a:chExt cx="2260491" cy="445630"/>
           </a:xfrm>
         </p:grpSpPr>
         <p:sp>
@@ -4141,7 +4192,7 @@
           <p:spPr>
             <a:xfrm>
               <a:off x="4555608" y="1573855"/>
-              <a:ext cx="1144631" cy="400842"/>
+              <a:ext cx="2260491" cy="400842"/>
             </a:xfrm>
             <a:prstGeom prst="roundRect">
               <a:avLst/>
@@ -4185,7 +4236,7 @@
           </p:nvSpPr>
           <p:spPr>
             <a:xfrm>
-              <a:off x="4757152" y="1562462"/>
+              <a:off x="5229452" y="1529067"/>
               <a:ext cx="697527" cy="338553"/>
             </a:xfrm>
             <a:prstGeom prst="rect">
@@ -4222,7 +4273,7 @@
         </p:nvGrpSpPr>
         <p:grpSpPr>
           <a:xfrm>
-            <a:off x="1526782" y="1852736"/>
+            <a:off x="1526782" y="2391170"/>
             <a:ext cx="1096975" cy="607452"/>
             <a:chOff x="4555608" y="1573855"/>
             <a:chExt cx="1151917" cy="607452"/>
@@ -4327,7 +4378,7 @@
         </p:nvGrpSpPr>
         <p:grpSpPr>
           <a:xfrm>
-            <a:off x="1526784" y="3937361"/>
+            <a:off x="1512979" y="3771689"/>
             <a:ext cx="2175076" cy="380419"/>
             <a:chOff x="4555608" y="1573855"/>
             <a:chExt cx="1889077" cy="607452"/>
@@ -4423,8 +4474,8 @@
         </p:nvCxnSpPr>
         <p:spPr>
           <a:xfrm flipH="1">
-            <a:off x="2071802" y="2448064"/>
-            <a:ext cx="4542" cy="336378"/>
+            <a:off x="2071802" y="2972692"/>
+            <a:ext cx="4542" cy="216443"/>
           </a:xfrm>
           <a:prstGeom prst="straightConnector1">
             <a:avLst/>
@@ -4460,7 +4511,7 @@
         </p:nvGrpSpPr>
         <p:grpSpPr>
           <a:xfrm>
-            <a:off x="1535380" y="2772940"/>
+            <a:off x="1512978" y="1311996"/>
             <a:ext cx="2166480" cy="416185"/>
             <a:chOff x="4555608" y="1562462"/>
             <a:chExt cx="1144631" cy="412235"/>
@@ -4551,15 +4602,13 @@
       <p:cxnSp>
         <p:nvCxnSpPr>
           <p:cNvPr id="63" name="直線箭頭接點 62"/>
-          <p:cNvCxnSpPr>
-            <a:stCxn id="22" idx="2"/>
-          </p:cNvCxnSpPr>
+          <p:cNvCxnSpPr/>
           <p:nvPr/>
         </p:nvCxnSpPr>
         <p:spPr>
           <a:xfrm>
-            <a:off x="2071802" y="1663506"/>
-            <a:ext cx="0" cy="187006"/>
+            <a:off x="2071802" y="2215746"/>
+            <a:ext cx="2" cy="187006"/>
           </a:xfrm>
           <a:prstGeom prst="straightConnector1">
             <a:avLst/>
@@ -4598,7 +4647,7 @@
         </p:nvCxnSpPr>
         <p:spPr>
           <a:xfrm>
-            <a:off x="2614321" y="3784961"/>
+            <a:off x="2600516" y="3619289"/>
             <a:ext cx="1" cy="152400"/>
           </a:xfrm>
           <a:prstGeom prst="straightConnector1">
@@ -4638,18 +4687,19 @@
         </p:nvCxnSpPr>
         <p:spPr>
           <a:xfrm rot="16200000" flipH="1">
-            <a:off x="3105821" y="3826280"/>
-            <a:ext cx="344476" cy="1327475"/>
+            <a:off x="3057501" y="3695123"/>
+            <a:ext cx="413506" cy="1327475"/>
           </a:xfrm>
           <a:prstGeom prst="bentConnector3">
             <a:avLst>
-              <a:gd name="adj1" fmla="val 29961"/>
+              <a:gd name="adj1" fmla="val 50000"/>
             </a:avLst>
           </a:prstGeom>
           <a:ln>
             <a:solidFill>
               <a:schemeClr val="tx1"/>
             </a:solidFill>
+            <a:prstDash val="sysDash"/>
             <a:tailEnd type="arrow"/>
           </a:ln>
           <a:effectLst/>
@@ -4677,7 +4727,7 @@
         </p:nvGrpSpPr>
         <p:grpSpPr>
           <a:xfrm>
-            <a:off x="4160251" y="3298018"/>
+            <a:off x="4146446" y="3132346"/>
             <a:ext cx="2175076" cy="450636"/>
             <a:chOff x="4555608" y="1573855"/>
             <a:chExt cx="2257354" cy="607452"/>
@@ -4773,7 +4823,7 @@
         </p:nvGrpSpPr>
         <p:grpSpPr>
           <a:xfrm>
-            <a:off x="4160252" y="3901054"/>
+            <a:off x="4146447" y="3735382"/>
             <a:ext cx="2175076" cy="380419"/>
             <a:chOff x="4555608" y="1573855"/>
             <a:chExt cx="1889077" cy="607452"/>
@@ -4872,52 +4922,11 @@
         </p:nvCxnSpPr>
         <p:spPr>
           <a:xfrm>
-            <a:off x="5247789" y="3748654"/>
+            <a:off x="5233984" y="3582982"/>
             <a:ext cx="1" cy="152400"/>
           </a:xfrm>
           <a:prstGeom prst="straightConnector1">
             <a:avLst/>
-          </a:prstGeom>
-          <a:ln>
-            <a:solidFill>
-              <a:schemeClr val="tx1"/>
-            </a:solidFill>
-            <a:tailEnd type="arrow"/>
-          </a:ln>
-          <a:effectLst/>
-        </p:spPr>
-        <p:style>
-          <a:lnRef idx="2">
-            <a:schemeClr val="accent1"/>
-          </a:lnRef>
-          <a:fillRef idx="0">
-            <a:schemeClr val="accent1"/>
-          </a:fillRef>
-          <a:effectRef idx="1">
-            <a:schemeClr val="accent1"/>
-          </a:effectRef>
-          <a:fontRef idx="minor">
-            <a:schemeClr val="tx1"/>
-          </a:fontRef>
-        </p:style>
-      </p:cxnSp>
-      <p:cxnSp>
-        <p:nvCxnSpPr>
-          <p:cNvPr id="75" name="肘形接點 74"/>
-          <p:cNvCxnSpPr>
-            <a:stCxn id="23" idx="2"/>
-          </p:cNvCxnSpPr>
-          <p:nvPr/>
-        </p:nvCxnSpPr>
-        <p:spPr>
-          <a:xfrm rot="5400000">
-            <a:off x="2961911" y="1375742"/>
-            <a:ext cx="1635714" cy="1181686"/>
-          </a:xfrm>
-          <a:prstGeom prst="bentConnector3">
-            <a:avLst>
-              <a:gd name="adj1" fmla="val 65192"/>
-            </a:avLst>
           </a:prstGeom>
           <a:ln>
             <a:solidFill>
@@ -4953,12 +4962,12 @@
         </p:nvCxnSpPr>
         <p:spPr>
           <a:xfrm rot="5400000">
-            <a:off x="4404403" y="3818868"/>
-            <a:ext cx="380783" cy="1305993"/>
+            <a:off x="4356083" y="3687711"/>
+            <a:ext cx="449813" cy="1305993"/>
           </a:xfrm>
           <a:prstGeom prst="bentConnector3">
             <a:avLst>
-              <a:gd name="adj1" fmla="val 35498"/>
+              <a:gd name="adj1" fmla="val 53069"/>
             </a:avLst>
           </a:prstGeom>
           <a:ln>
@@ -4987,16 +4996,13 @@
       <p:cxnSp>
         <p:nvCxnSpPr>
           <p:cNvPr id="87" name="直線箭頭接點 86"/>
-          <p:cNvCxnSpPr>
-            <a:stCxn id="61" idx="2"/>
-            <a:endCxn id="2" idx="0"/>
-          </p:cNvCxnSpPr>
+          <p:cNvCxnSpPr/>
           <p:nvPr/>
         </p:nvCxnSpPr>
         <p:spPr>
-          <a:xfrm flipH="1">
-            <a:off x="2614321" y="3189125"/>
-            <a:ext cx="4299" cy="145200"/>
+          <a:xfrm>
+            <a:off x="3148412" y="2215746"/>
+            <a:ext cx="0" cy="916600"/>
           </a:xfrm>
           <a:prstGeom prst="straightConnector1">
             <a:avLst/>
@@ -5027,15 +5033,13 @@
       <p:cxnSp>
         <p:nvCxnSpPr>
           <p:cNvPr id="91" name="直線箭頭接點 90"/>
-          <p:cNvCxnSpPr>
-            <a:stCxn id="92" idx="2"/>
-          </p:cNvCxnSpPr>
+          <p:cNvCxnSpPr/>
           <p:nvPr/>
         </p:nvCxnSpPr>
         <p:spPr>
-          <a:xfrm flipH="1">
-            <a:off x="5708645" y="1137303"/>
-            <a:ext cx="5770" cy="215659"/>
+          <a:xfrm>
+            <a:off x="5714415" y="1151109"/>
+            <a:ext cx="0" cy="740735"/>
           </a:xfrm>
           <a:prstGeom prst="straightConnector1">
             <a:avLst/>
@@ -5116,10 +5120,10 @@
         </p:nvGrpSpPr>
         <p:grpSpPr>
           <a:xfrm>
-            <a:off x="5159084" y="1344597"/>
-            <a:ext cx="1090037" cy="318909"/>
-            <a:chOff x="4555608" y="1562462"/>
-            <a:chExt cx="1144631" cy="412235"/>
+            <a:off x="4155043" y="1878038"/>
+            <a:ext cx="2102675" cy="337708"/>
+            <a:chOff x="3492252" y="1538163"/>
+            <a:chExt cx="2207987" cy="436535"/>
           </a:xfrm>
         </p:grpSpPr>
         <p:sp>
@@ -5130,8 +5134,8 @@
           </p:nvSpPr>
           <p:spPr>
             <a:xfrm>
-              <a:off x="4555608" y="1573855"/>
-              <a:ext cx="1144631" cy="400842"/>
+              <a:off x="3492252" y="1573855"/>
+              <a:ext cx="2207987" cy="400843"/>
             </a:xfrm>
             <a:prstGeom prst="roundRect">
               <a:avLst/>
@@ -5175,7 +5179,7 @@
           </p:nvSpPr>
           <p:spPr>
             <a:xfrm>
-              <a:off x="4757152" y="1562462"/>
+              <a:off x="4177934" y="1538163"/>
               <a:ext cx="697527" cy="338553"/>
             </a:xfrm>
             <a:prstGeom prst="rect">
@@ -5212,7 +5216,7 @@
         </p:nvGrpSpPr>
         <p:grpSpPr>
           <a:xfrm>
-            <a:off x="5159083" y="1852736"/>
+            <a:off x="5159083" y="2371250"/>
             <a:ext cx="1096975" cy="607452"/>
             <a:chOff x="4555608" y="1573855"/>
             <a:chExt cx="1151917" cy="607452"/>
@@ -5312,13 +5316,15 @@
       <p:cxnSp>
         <p:nvCxnSpPr>
           <p:cNvPr id="99" name="直線箭頭接點 98"/>
-          <p:cNvCxnSpPr/>
+          <p:cNvCxnSpPr>
+            <a:stCxn id="97" idx="2"/>
+          </p:cNvCxnSpPr>
           <p:nvPr/>
         </p:nvCxnSpPr>
         <p:spPr>
-          <a:xfrm flipH="1">
-            <a:off x="5704103" y="2448064"/>
-            <a:ext cx="4542" cy="849954"/>
+          <a:xfrm>
+            <a:off x="5704102" y="2978702"/>
+            <a:ext cx="10313" cy="153644"/>
           </a:xfrm>
           <a:prstGeom prst="straightConnector1">
             <a:avLst/>
@@ -5349,15 +5355,13 @@
       <p:cxnSp>
         <p:nvCxnSpPr>
           <p:cNvPr id="100" name="直線箭頭接點 99"/>
-          <p:cNvCxnSpPr>
-            <a:stCxn id="94" idx="2"/>
-          </p:cNvCxnSpPr>
+          <p:cNvCxnSpPr/>
           <p:nvPr/>
         </p:nvCxnSpPr>
         <p:spPr>
           <a:xfrm>
-            <a:off x="5704103" y="1663506"/>
-            <a:ext cx="0" cy="187006"/>
+            <a:off x="4693656" y="2215748"/>
+            <a:ext cx="0" cy="945029"/>
           </a:xfrm>
           <a:prstGeom prst="straightConnector1">
             <a:avLst/>
@@ -5387,21 +5391,17 @@
       </p:cxnSp>
       <p:cxnSp>
         <p:nvCxnSpPr>
-          <p:cNvPr id="103" name="肘形接點 102"/>
-          <p:cNvCxnSpPr>
-            <a:stCxn id="23" idx="2"/>
-          </p:cNvCxnSpPr>
+          <p:cNvPr id="101" name="直線箭頭接點 100"/>
+          <p:cNvCxnSpPr/>
           <p:nvPr/>
         </p:nvCxnSpPr>
         <p:spPr>
-          <a:xfrm rot="16200000" flipH="1">
-            <a:off x="3510371" y="2008967"/>
-            <a:ext cx="2149292" cy="428813"/>
-          </a:xfrm>
-          <a:prstGeom prst="bentConnector3">
-            <a:avLst>
-              <a:gd name="adj1" fmla="val 50000"/>
-            </a:avLst>
+          <a:xfrm>
+            <a:off x="5714415" y="2200899"/>
+            <a:ext cx="0" cy="215659"/>
+          </a:xfrm>
+          <a:prstGeom prst="straightConnector1">
+            <a:avLst/>
           </a:prstGeom>
           <a:ln>
             <a:solidFill>
@@ -5426,52 +5426,157 @@
           </a:fontRef>
         </p:style>
       </p:cxnSp>
-      <p:sp>
-        <p:nvSpPr>
-          <p:cNvPr id="50" name="圓角矩形 49"/>
-          <p:cNvSpPr/>
-          <p:nvPr/>
-        </p:nvSpPr>
-        <p:spPr>
-          <a:xfrm>
-            <a:off x="1366682" y="588715"/>
-            <a:ext cx="2471072" cy="3953374"/>
-          </a:xfrm>
-          <a:prstGeom prst="roundRect">
+      <p:cxnSp>
+        <p:nvCxnSpPr>
+          <p:cNvPr id="102" name="直線箭頭接點 101"/>
+          <p:cNvCxnSpPr/>
+          <p:nvPr/>
+        </p:nvCxnSpPr>
+        <p:spPr>
+          <a:xfrm>
+            <a:off x="4693402" y="1137303"/>
+            <a:ext cx="0" cy="740735"/>
+          </a:xfrm>
+          <a:prstGeom prst="straightConnector1">
             <a:avLst/>
           </a:prstGeom>
-          <a:noFill/>
           <a:ln>
             <a:solidFill>
               <a:schemeClr val="tx1"/>
             </a:solidFill>
-            <a:prstDash val="dash"/>
+            <a:tailEnd type="arrow"/>
           </a:ln>
           <a:effectLst/>
         </p:spPr>
         <p:style>
-          <a:lnRef idx="1">
+          <a:lnRef idx="2">
             <a:schemeClr val="accent1"/>
           </a:lnRef>
-          <a:fillRef idx="3">
+          <a:fillRef idx="0">
             <a:schemeClr val="accent1"/>
           </a:fillRef>
-          <a:effectRef idx="2">
+          <a:effectRef idx="1">
             <a:schemeClr val="accent1"/>
           </a:effectRef>
           <a:fontRef idx="minor">
-            <a:schemeClr val="lt1"/>
+            <a:schemeClr val="tx1"/>
           </a:fontRef>
         </p:style>
-        <p:txBody>
-          <a:bodyPr rtlCol="0" anchor="ctr"/>
-          <a:lstStyle/>
-          <a:p>
-            <a:pPr algn="ctr"/>
-            <a:endParaRPr kumimoji="1" lang="zh-TW" altLang="en-US"/>
-          </a:p>
-        </p:txBody>
-      </p:sp>
+      </p:cxnSp>
+      <p:cxnSp>
+        <p:nvCxnSpPr>
+          <p:cNvPr id="104" name="直線箭頭接點 103"/>
+          <p:cNvCxnSpPr/>
+          <p:nvPr/>
+        </p:nvCxnSpPr>
+        <p:spPr>
+          <a:xfrm>
+            <a:off x="2075317" y="1144026"/>
+            <a:ext cx="1074" cy="179472"/>
+          </a:xfrm>
+          <a:prstGeom prst="straightConnector1">
+            <a:avLst/>
+          </a:prstGeom>
+          <a:ln>
+            <a:solidFill>
+              <a:schemeClr val="tx1"/>
+            </a:solidFill>
+            <a:tailEnd type="arrow"/>
+          </a:ln>
+          <a:effectLst/>
+        </p:spPr>
+        <p:style>
+          <a:lnRef idx="2">
+            <a:schemeClr val="accent1"/>
+          </a:lnRef>
+          <a:fillRef idx="0">
+            <a:schemeClr val="accent1"/>
+          </a:fillRef>
+          <a:effectRef idx="1">
+            <a:schemeClr val="accent1"/>
+          </a:effectRef>
+          <a:fontRef idx="minor">
+            <a:schemeClr val="tx1"/>
+          </a:fontRef>
+        </p:style>
+      </p:cxnSp>
+      <p:cxnSp>
+        <p:nvCxnSpPr>
+          <p:cNvPr id="85" name="直線接點 84"/>
+          <p:cNvCxnSpPr>
+            <a:endCxn id="23" idx="1"/>
+          </p:cNvCxnSpPr>
+          <p:nvPr/>
+        </p:nvCxnSpPr>
+        <p:spPr>
+          <a:xfrm>
+            <a:off x="3148412" y="844915"/>
+            <a:ext cx="1091844" cy="0"/>
+          </a:xfrm>
+          <a:prstGeom prst="line">
+            <a:avLst/>
+          </a:prstGeom>
+          <a:ln>
+            <a:solidFill>
+              <a:schemeClr val="tx1"/>
+            </a:solidFill>
+            <a:prstDash val="sysDash"/>
+          </a:ln>
+          <a:effectLst/>
+        </p:spPr>
+        <p:style>
+          <a:lnRef idx="2">
+            <a:schemeClr val="accent1"/>
+          </a:lnRef>
+          <a:fillRef idx="0">
+            <a:schemeClr val="accent1"/>
+          </a:fillRef>
+          <a:effectRef idx="1">
+            <a:schemeClr val="accent1"/>
+          </a:effectRef>
+          <a:fontRef idx="minor">
+            <a:schemeClr val="tx1"/>
+          </a:fontRef>
+        </p:style>
+      </p:cxnSp>
+      <p:cxnSp>
+        <p:nvCxnSpPr>
+          <p:cNvPr id="105" name="直線箭頭接點 104"/>
+          <p:cNvCxnSpPr/>
+          <p:nvPr/>
+        </p:nvCxnSpPr>
+        <p:spPr>
+          <a:xfrm>
+            <a:off x="3148412" y="844915"/>
+            <a:ext cx="0" cy="467081"/>
+          </a:xfrm>
+          <a:prstGeom prst="straightConnector1">
+            <a:avLst/>
+          </a:prstGeom>
+          <a:ln>
+            <a:solidFill>
+              <a:schemeClr val="tx1"/>
+            </a:solidFill>
+            <a:prstDash val="sysDash"/>
+            <a:tailEnd type="arrow"/>
+          </a:ln>
+          <a:effectLst/>
+        </p:spPr>
+        <p:style>
+          <a:lnRef idx="2">
+            <a:schemeClr val="accent1"/>
+          </a:lnRef>
+          <a:fillRef idx="0">
+            <a:schemeClr val="accent1"/>
+          </a:fillRef>
+          <a:effectRef idx="1">
+            <a:schemeClr val="accent1"/>
+          </a:effectRef>
+          <a:fontRef idx="minor">
+            <a:schemeClr val="tx1"/>
+          </a:fontRef>
+        </p:style>
+      </p:cxnSp>
     </p:spTree>
     <p:extLst>
       <p:ext uri="{BB962C8B-B14F-4D97-AF65-F5344CB8AC3E}">
@@ -6064,6 +6169,689 @@
     <p:extLst>
       <p:ext uri="{BB962C8B-B14F-4D97-AF65-F5344CB8AC3E}">
         <p14:creationId xmlns:p14="http://schemas.microsoft.com/office/powerpoint/2010/main" val="1139673491"/>
+      </p:ext>
+    </p:extLst>
+  </p:cSld>
+  <p:clrMapOvr>
+    <a:masterClrMapping/>
+  </p:clrMapOvr>
+</p:sld>
+</file>
+
+<file path=ppt/slides/slide4.xml><?xml version="1.0" encoding="utf-8"?>
+<p:sld xmlns:a="http://schemas.openxmlformats.org/drawingml/2006/main" xmlns:r="http://schemas.openxmlformats.org/officeDocument/2006/relationships" xmlns:p="http://schemas.openxmlformats.org/presentationml/2006/main">
+  <p:cSld>
+    <p:spTree>
+      <p:nvGrpSpPr>
+        <p:cNvPr id="1" name=""/>
+        <p:cNvGrpSpPr/>
+        <p:nvPr/>
+      </p:nvGrpSpPr>
+      <p:grpSpPr>
+        <a:xfrm>
+          <a:off x="0" y="0"/>
+          <a:ext cx="0" cy="0"/>
+          <a:chOff x="0" y="0"/>
+          <a:chExt cx="0" cy="0"/>
+        </a:xfrm>
+      </p:grpSpPr>
+      <p:sp>
+        <p:nvSpPr>
+          <p:cNvPr id="7" name="矩形 6"/>
+          <p:cNvSpPr/>
+          <p:nvPr/>
+        </p:nvSpPr>
+        <p:spPr>
+          <a:xfrm>
+            <a:off x="1546145" y="1642883"/>
+            <a:ext cx="1187219" cy="1118265"/>
+          </a:xfrm>
+          <a:prstGeom prst="rect">
+            <a:avLst/>
+          </a:prstGeom>
+          <a:noFill/>
+          <a:ln>
+            <a:solidFill>
+              <a:schemeClr val="tx1"/>
+            </a:solidFill>
+          </a:ln>
+          <a:effectLst/>
+        </p:spPr>
+        <p:style>
+          <a:lnRef idx="1">
+            <a:schemeClr val="accent1"/>
+          </a:lnRef>
+          <a:fillRef idx="3">
+            <a:schemeClr val="accent1"/>
+          </a:fillRef>
+          <a:effectRef idx="2">
+            <a:schemeClr val="accent1"/>
+          </a:effectRef>
+          <a:fontRef idx="minor">
+            <a:schemeClr val="lt1"/>
+          </a:fontRef>
+        </p:style>
+        <p:txBody>
+          <a:bodyPr rtlCol="0" anchor="ctr"/>
+          <a:lstStyle/>
+          <a:p>
+            <a:pPr algn="ctr"/>
+            <a:endParaRPr kumimoji="1" lang="zh-TW" altLang="en-US" i="1"/>
+          </a:p>
+        </p:txBody>
+      </p:sp>
+      <p:sp>
+        <p:nvSpPr>
+          <p:cNvPr id="8" name="文字方塊 7"/>
+          <p:cNvSpPr txBox="1"/>
+          <p:nvPr/>
+        </p:nvSpPr>
+        <p:spPr>
+          <a:xfrm>
+            <a:off x="1963561" y="1996642"/>
+            <a:ext cx="402749" cy="369332"/>
+          </a:xfrm>
+          <a:prstGeom prst="rect">
+            <a:avLst/>
+          </a:prstGeom>
+          <a:noFill/>
+        </p:spPr>
+        <p:txBody>
+          <a:bodyPr wrap="none" rtlCol="0">
+            <a:spAutoFit/>
+          </a:bodyPr>
+          <a:lstStyle/>
+          <a:p>
+            <a:r>
+              <a:rPr kumimoji="1" lang="en-US" altLang="zh-TW" i="1" dirty="0" smtClean="0">
+                <a:latin typeface="Arial"/>
+                <a:cs typeface="Arial"/>
+              </a:rPr>
+              <a:t>X</a:t>
+            </a:r>
+            <a:endParaRPr kumimoji="1" lang="zh-TW" altLang="en-US" i="1" dirty="0">
+              <a:latin typeface="Arial"/>
+              <a:cs typeface="Arial"/>
+            </a:endParaRPr>
+          </a:p>
+        </p:txBody>
+      </p:sp>
+      <p:sp>
+        <p:nvSpPr>
+          <p:cNvPr id="12" name="文字方塊 11"/>
+          <p:cNvSpPr txBox="1"/>
+          <p:nvPr/>
+        </p:nvSpPr>
+        <p:spPr>
+          <a:xfrm>
+            <a:off x="2816191" y="2010446"/>
+            <a:ext cx="366970" cy="369332"/>
+          </a:xfrm>
+          <a:prstGeom prst="rect">
+            <a:avLst/>
+          </a:prstGeom>
+          <a:noFill/>
+        </p:spPr>
+        <p:txBody>
+          <a:bodyPr wrap="none" rtlCol="0">
+            <a:spAutoFit/>
+          </a:bodyPr>
+          <a:lstStyle/>
+          <a:p>
+            <a:r>
+              <a:rPr kumimoji="1" lang="en-US" altLang="zh-TW" i="1" dirty="0" smtClean="0"/>
+              <a:t>=</a:t>
+            </a:r>
+            <a:endParaRPr kumimoji="1" lang="zh-TW" altLang="en-US" i="1" dirty="0"/>
+          </a:p>
+        </p:txBody>
+      </p:sp>
+      <p:sp>
+        <p:nvSpPr>
+          <p:cNvPr id="13" name="矩形 12"/>
+          <p:cNvSpPr/>
+          <p:nvPr/>
+        </p:nvSpPr>
+        <p:spPr>
+          <a:xfrm>
+            <a:off x="3189471" y="1643420"/>
+            <a:ext cx="513670" cy="1118265"/>
+          </a:xfrm>
+          <a:prstGeom prst="rect">
+            <a:avLst/>
+          </a:prstGeom>
+          <a:noFill/>
+          <a:ln>
+            <a:solidFill>
+              <a:schemeClr val="tx1"/>
+            </a:solidFill>
+          </a:ln>
+          <a:effectLst/>
+        </p:spPr>
+        <p:style>
+          <a:lnRef idx="1">
+            <a:schemeClr val="accent1"/>
+          </a:lnRef>
+          <a:fillRef idx="3">
+            <a:schemeClr val="accent1"/>
+          </a:fillRef>
+          <a:effectRef idx="2">
+            <a:schemeClr val="accent1"/>
+          </a:effectRef>
+          <a:fontRef idx="minor">
+            <a:schemeClr val="lt1"/>
+          </a:fontRef>
+        </p:style>
+        <p:txBody>
+          <a:bodyPr rtlCol="0" anchor="ctr"/>
+          <a:lstStyle/>
+          <a:p>
+            <a:pPr algn="ctr"/>
+            <a:endParaRPr kumimoji="1" lang="zh-TW" altLang="en-US" i="1"/>
+          </a:p>
+        </p:txBody>
+      </p:sp>
+      <p:sp>
+        <p:nvSpPr>
+          <p:cNvPr id="14" name="文字方塊 13"/>
+          <p:cNvSpPr txBox="1"/>
+          <p:nvPr/>
+        </p:nvSpPr>
+        <p:spPr>
+          <a:xfrm>
+            <a:off x="3189470" y="1996642"/>
+            <a:ext cx="559720" cy="369332"/>
+          </a:xfrm>
+          <a:prstGeom prst="rect">
+            <a:avLst/>
+          </a:prstGeom>
+          <a:noFill/>
+        </p:spPr>
+        <p:txBody>
+          <a:bodyPr wrap="none" rtlCol="0">
+            <a:spAutoFit/>
+          </a:bodyPr>
+          <a:lstStyle/>
+          <a:p>
+            <a:r>
+              <a:rPr kumimoji="1" lang="en-US" altLang="zh-TW" i="1" dirty="0" smtClean="0">
+                <a:latin typeface="Arial"/>
+                <a:cs typeface="Arial"/>
+              </a:rPr>
+              <a:t>W</a:t>
+            </a:r>
+            <a:r>
+              <a:rPr kumimoji="1" lang="en-US" altLang="zh-TW" i="1" baseline="-25000" dirty="0" smtClean="0">
+                <a:latin typeface="Arial"/>
+                <a:cs typeface="Arial"/>
+              </a:rPr>
+              <a:t>D</a:t>
+            </a:r>
+            <a:endParaRPr kumimoji="1" lang="zh-TW" altLang="en-US" i="1" baseline="-25000" dirty="0">
+              <a:latin typeface="Arial"/>
+              <a:cs typeface="Arial"/>
+            </a:endParaRPr>
+          </a:p>
+        </p:txBody>
+      </p:sp>
+      <p:sp>
+        <p:nvSpPr>
+          <p:cNvPr id="15" name="矩形 14"/>
+          <p:cNvSpPr/>
+          <p:nvPr/>
+        </p:nvSpPr>
+        <p:spPr>
+          <a:xfrm>
+            <a:off x="3703141" y="1643420"/>
+            <a:ext cx="513670" cy="1118265"/>
+          </a:xfrm>
+          <a:prstGeom prst="rect">
+            <a:avLst/>
+          </a:prstGeom>
+          <a:noFill/>
+          <a:ln>
+            <a:solidFill>
+              <a:schemeClr val="tx1"/>
+            </a:solidFill>
+          </a:ln>
+          <a:effectLst/>
+        </p:spPr>
+        <p:style>
+          <a:lnRef idx="1">
+            <a:schemeClr val="accent1"/>
+          </a:lnRef>
+          <a:fillRef idx="3">
+            <a:schemeClr val="accent1"/>
+          </a:fillRef>
+          <a:effectRef idx="2">
+            <a:schemeClr val="accent1"/>
+          </a:effectRef>
+          <a:fontRef idx="minor">
+            <a:schemeClr val="lt1"/>
+          </a:fontRef>
+        </p:style>
+        <p:txBody>
+          <a:bodyPr rtlCol="0" anchor="ctr"/>
+          <a:lstStyle/>
+          <a:p>
+            <a:pPr algn="ctr"/>
+            <a:endParaRPr kumimoji="1" lang="zh-TW" altLang="en-US" i="1"/>
+          </a:p>
+        </p:txBody>
+      </p:sp>
+      <p:sp>
+        <p:nvSpPr>
+          <p:cNvPr id="16" name="文字方塊 15"/>
+          <p:cNvSpPr txBox="1"/>
+          <p:nvPr/>
+        </p:nvSpPr>
+        <p:spPr>
+          <a:xfrm>
+            <a:off x="3703140" y="1996642"/>
+            <a:ext cx="559720" cy="369332"/>
+          </a:xfrm>
+          <a:prstGeom prst="rect">
+            <a:avLst/>
+          </a:prstGeom>
+          <a:noFill/>
+        </p:spPr>
+        <p:txBody>
+          <a:bodyPr wrap="none" rtlCol="0">
+            <a:spAutoFit/>
+          </a:bodyPr>
+          <a:lstStyle/>
+          <a:p>
+            <a:r>
+              <a:rPr kumimoji="1" lang="en-US" altLang="zh-TW" i="1" dirty="0" smtClean="0">
+                <a:latin typeface="Arial"/>
+                <a:cs typeface="Arial"/>
+              </a:rPr>
+              <a:t>W</a:t>
+            </a:r>
+            <a:r>
+              <a:rPr kumimoji="1" lang="en-US" altLang="zh-TW" i="1" baseline="-25000" dirty="0" smtClean="0">
+                <a:latin typeface="Arial"/>
+                <a:cs typeface="Arial"/>
+              </a:rPr>
+              <a:t>H</a:t>
+            </a:r>
+            <a:endParaRPr kumimoji="1" lang="zh-TW" altLang="en-US" i="1" baseline="-25000" dirty="0">
+              <a:latin typeface="Arial"/>
+              <a:cs typeface="Arial"/>
+            </a:endParaRPr>
+          </a:p>
+        </p:txBody>
+      </p:sp>
+      <p:sp>
+        <p:nvSpPr>
+          <p:cNvPr id="17" name="文字方塊 16"/>
+          <p:cNvSpPr txBox="1"/>
+          <p:nvPr/>
+        </p:nvSpPr>
+        <p:spPr>
+          <a:xfrm>
+            <a:off x="4321467" y="2010446"/>
+            <a:ext cx="287258" cy="369332"/>
+          </a:xfrm>
+          <a:prstGeom prst="rect">
+            <a:avLst/>
+          </a:prstGeom>
+          <a:noFill/>
+        </p:spPr>
+        <p:txBody>
+          <a:bodyPr wrap="none" rtlCol="0">
+            <a:spAutoFit/>
+          </a:bodyPr>
+          <a:lstStyle/>
+          <a:p>
+            <a:r>
+              <a:rPr kumimoji="1" lang="en-US" altLang="zh-TW" dirty="0"/>
+              <a:t>x</a:t>
+            </a:r>
+            <a:endParaRPr kumimoji="1" lang="zh-TW" altLang="en-US" dirty="0"/>
+          </a:p>
+        </p:txBody>
+      </p:sp>
+      <p:sp>
+        <p:nvSpPr>
+          <p:cNvPr id="18" name="矩形 17"/>
+          <p:cNvSpPr/>
+          <p:nvPr/>
+        </p:nvSpPr>
+        <p:spPr>
+          <a:xfrm>
+            <a:off x="4664188" y="1640535"/>
+            <a:ext cx="1255150" cy="353222"/>
+          </a:xfrm>
+          <a:prstGeom prst="rect">
+            <a:avLst/>
+          </a:prstGeom>
+          <a:noFill/>
+          <a:ln>
+            <a:solidFill>
+              <a:schemeClr val="tx1"/>
+            </a:solidFill>
+          </a:ln>
+          <a:effectLst/>
+        </p:spPr>
+        <p:style>
+          <a:lnRef idx="1">
+            <a:schemeClr val="accent1"/>
+          </a:lnRef>
+          <a:fillRef idx="3">
+            <a:schemeClr val="accent1"/>
+          </a:fillRef>
+          <a:effectRef idx="2">
+            <a:schemeClr val="accent1"/>
+          </a:effectRef>
+          <a:fontRef idx="minor">
+            <a:schemeClr val="lt1"/>
+          </a:fontRef>
+        </p:style>
+        <p:txBody>
+          <a:bodyPr rtlCol="0" anchor="ctr"/>
+          <a:lstStyle/>
+          <a:p>
+            <a:pPr algn="ctr"/>
+            <a:endParaRPr kumimoji="1" lang="zh-TW" altLang="en-US" i="1"/>
+          </a:p>
+        </p:txBody>
+      </p:sp>
+      <p:sp>
+        <p:nvSpPr>
+          <p:cNvPr id="19" name="文字方塊 18"/>
+          <p:cNvSpPr txBox="1"/>
+          <p:nvPr/>
+        </p:nvSpPr>
+        <p:spPr>
+          <a:xfrm>
+            <a:off x="5012260" y="1624425"/>
+            <a:ext cx="508549" cy="369332"/>
+          </a:xfrm>
+          <a:prstGeom prst="rect">
+            <a:avLst/>
+          </a:prstGeom>
+          <a:noFill/>
+        </p:spPr>
+        <p:txBody>
+          <a:bodyPr wrap="none" rtlCol="0">
+            <a:spAutoFit/>
+          </a:bodyPr>
+          <a:lstStyle/>
+          <a:p>
+            <a:r>
+              <a:rPr kumimoji="1" lang="en-US" altLang="zh-TW" i="1" dirty="0" smtClean="0">
+                <a:latin typeface="Arial"/>
+                <a:cs typeface="Arial"/>
+              </a:rPr>
+              <a:t>H</a:t>
+            </a:r>
+            <a:r>
+              <a:rPr kumimoji="1" lang="en-US" altLang="zh-TW" i="1" baseline="-25000" dirty="0" smtClean="0">
+                <a:latin typeface="Arial"/>
+                <a:cs typeface="Arial"/>
+              </a:rPr>
+              <a:t>D</a:t>
+            </a:r>
+            <a:endParaRPr kumimoji="1" lang="zh-TW" altLang="en-US" i="1" baseline="-25000" dirty="0">
+              <a:latin typeface="Arial"/>
+              <a:cs typeface="Arial"/>
+            </a:endParaRPr>
+          </a:p>
+        </p:txBody>
+      </p:sp>
+      <p:sp>
+        <p:nvSpPr>
+          <p:cNvPr id="22" name="矩形 21"/>
+          <p:cNvSpPr/>
+          <p:nvPr/>
+        </p:nvSpPr>
+        <p:spPr>
+          <a:xfrm>
+            <a:off x="4664188" y="1988523"/>
+            <a:ext cx="1255150" cy="353222"/>
+          </a:xfrm>
+          <a:prstGeom prst="rect">
+            <a:avLst/>
+          </a:prstGeom>
+          <a:noFill/>
+          <a:ln>
+            <a:solidFill>
+              <a:schemeClr val="tx1"/>
+            </a:solidFill>
+          </a:ln>
+          <a:effectLst/>
+        </p:spPr>
+        <p:style>
+          <a:lnRef idx="1">
+            <a:schemeClr val="accent1"/>
+          </a:lnRef>
+          <a:fillRef idx="3">
+            <a:schemeClr val="accent1"/>
+          </a:fillRef>
+          <a:effectRef idx="2">
+            <a:schemeClr val="accent1"/>
+          </a:effectRef>
+          <a:fontRef idx="minor">
+            <a:schemeClr val="lt1"/>
+          </a:fontRef>
+        </p:style>
+        <p:txBody>
+          <a:bodyPr rtlCol="0" anchor="ctr"/>
+          <a:lstStyle/>
+          <a:p>
+            <a:pPr algn="ctr"/>
+            <a:endParaRPr kumimoji="1" lang="zh-TW" altLang="en-US" i="1"/>
+          </a:p>
+        </p:txBody>
+      </p:sp>
+      <p:sp>
+        <p:nvSpPr>
+          <p:cNvPr id="23" name="文字方塊 22"/>
+          <p:cNvSpPr txBox="1"/>
+          <p:nvPr/>
+        </p:nvSpPr>
+        <p:spPr>
+          <a:xfrm>
+            <a:off x="5012260" y="1972413"/>
+            <a:ext cx="508549" cy="369332"/>
+          </a:xfrm>
+          <a:prstGeom prst="rect">
+            <a:avLst/>
+          </a:prstGeom>
+          <a:noFill/>
+        </p:spPr>
+        <p:txBody>
+          <a:bodyPr wrap="none" rtlCol="0">
+            <a:spAutoFit/>
+          </a:bodyPr>
+          <a:lstStyle/>
+          <a:p>
+            <a:r>
+              <a:rPr kumimoji="1" lang="en-US" altLang="zh-TW" i="1" dirty="0" smtClean="0">
+                <a:latin typeface="Arial"/>
+                <a:cs typeface="Arial"/>
+              </a:rPr>
+              <a:t>H</a:t>
+            </a:r>
+            <a:r>
+              <a:rPr kumimoji="1" lang="en-US" altLang="zh-TW" i="1" baseline="-25000" dirty="0" smtClean="0">
+                <a:latin typeface="Arial"/>
+                <a:cs typeface="Arial"/>
+              </a:rPr>
+              <a:t>H</a:t>
+            </a:r>
+            <a:endParaRPr kumimoji="1" lang="zh-TW" altLang="en-US" i="1" baseline="-25000" dirty="0">
+              <a:latin typeface="Arial"/>
+              <a:cs typeface="Arial"/>
+            </a:endParaRPr>
+          </a:p>
+        </p:txBody>
+      </p:sp>
+      <p:sp>
+        <p:nvSpPr>
+          <p:cNvPr id="25" name="左大括弧 24"/>
+          <p:cNvSpPr/>
+          <p:nvPr/>
+        </p:nvSpPr>
+        <p:spPr>
+          <a:xfrm rot="5400000">
+            <a:off x="3578240" y="913188"/>
+            <a:ext cx="249802" cy="961089"/>
+          </a:xfrm>
+          <a:prstGeom prst="leftBrace">
+            <a:avLst/>
+          </a:prstGeom>
+          <a:ln>
+            <a:solidFill>
+              <a:schemeClr val="tx1"/>
+            </a:solidFill>
+          </a:ln>
+          <a:effectLst/>
+        </p:spPr>
+        <p:style>
+          <a:lnRef idx="2">
+            <a:schemeClr val="accent1"/>
+          </a:lnRef>
+          <a:fillRef idx="0">
+            <a:schemeClr val="accent1"/>
+          </a:fillRef>
+          <a:effectRef idx="1">
+            <a:schemeClr val="accent1"/>
+          </a:effectRef>
+          <a:fontRef idx="minor">
+            <a:schemeClr val="tx1"/>
+          </a:fontRef>
+        </p:style>
+        <p:txBody>
+          <a:bodyPr rtlCol="0" anchor="ctr"/>
+          <a:lstStyle/>
+          <a:p>
+            <a:pPr algn="ctr"/>
+            <a:endParaRPr kumimoji="1" lang="zh-TW" altLang="en-US"/>
+          </a:p>
+        </p:txBody>
+      </p:sp>
+      <p:sp>
+        <p:nvSpPr>
+          <p:cNvPr id="26" name="左大括弧 25"/>
+          <p:cNvSpPr/>
+          <p:nvPr/>
+        </p:nvSpPr>
+        <p:spPr>
+          <a:xfrm rot="5400000">
+            <a:off x="5146151" y="786869"/>
+            <a:ext cx="291226" cy="1255148"/>
+          </a:xfrm>
+          <a:prstGeom prst="leftBrace">
+            <a:avLst/>
+          </a:prstGeom>
+          <a:ln>
+            <a:solidFill>
+              <a:schemeClr val="tx1"/>
+            </a:solidFill>
+          </a:ln>
+          <a:effectLst/>
+        </p:spPr>
+        <p:style>
+          <a:lnRef idx="2">
+            <a:schemeClr val="accent1"/>
+          </a:lnRef>
+          <a:fillRef idx="0">
+            <a:schemeClr val="accent1"/>
+          </a:fillRef>
+          <a:effectRef idx="1">
+            <a:schemeClr val="accent1"/>
+          </a:effectRef>
+          <a:fontRef idx="minor">
+            <a:schemeClr val="tx1"/>
+          </a:fontRef>
+        </p:style>
+        <p:txBody>
+          <a:bodyPr rtlCol="0" anchor="ctr"/>
+          <a:lstStyle/>
+          <a:p>
+            <a:pPr algn="ctr"/>
+            <a:endParaRPr kumimoji="1" lang="zh-TW" altLang="en-US"/>
+          </a:p>
+        </p:txBody>
+      </p:sp>
+      <p:sp>
+        <p:nvSpPr>
+          <p:cNvPr id="27" name="文字方塊 26"/>
+          <p:cNvSpPr txBox="1"/>
+          <p:nvPr/>
+        </p:nvSpPr>
+        <p:spPr>
+          <a:xfrm>
+            <a:off x="3469330" y="935087"/>
+            <a:ext cx="452027" cy="369332"/>
+          </a:xfrm>
+          <a:prstGeom prst="rect">
+            <a:avLst/>
+          </a:prstGeom>
+          <a:noFill/>
+        </p:spPr>
+        <p:txBody>
+          <a:bodyPr wrap="none" rtlCol="0">
+            <a:spAutoFit/>
+          </a:bodyPr>
+          <a:lstStyle/>
+          <a:p>
+            <a:r>
+              <a:rPr kumimoji="1" lang="en-US" altLang="zh-TW" i="1" dirty="0" smtClean="0">
+                <a:latin typeface="Arial"/>
+                <a:cs typeface="Arial"/>
+              </a:rPr>
+              <a:t>W</a:t>
+            </a:r>
+            <a:endParaRPr kumimoji="1" lang="zh-TW" altLang="en-US" i="1" baseline="-25000" dirty="0">
+              <a:latin typeface="Arial"/>
+              <a:cs typeface="Arial"/>
+            </a:endParaRPr>
+          </a:p>
+        </p:txBody>
+      </p:sp>
+      <p:sp>
+        <p:nvSpPr>
+          <p:cNvPr id="28" name="文字方塊 27"/>
+          <p:cNvSpPr txBox="1"/>
+          <p:nvPr/>
+        </p:nvSpPr>
+        <p:spPr>
+          <a:xfrm>
+            <a:off x="5111653" y="945540"/>
+            <a:ext cx="396444" cy="369332"/>
+          </a:xfrm>
+          <a:prstGeom prst="rect">
+            <a:avLst/>
+          </a:prstGeom>
+          <a:noFill/>
+        </p:spPr>
+        <p:txBody>
+          <a:bodyPr wrap="none" rtlCol="0">
+            <a:spAutoFit/>
+          </a:bodyPr>
+          <a:lstStyle/>
+          <a:p>
+            <a:r>
+              <a:rPr kumimoji="1" lang="en-US" altLang="zh-TW" i="1" dirty="0" smtClean="0">
+                <a:latin typeface="Arial"/>
+                <a:cs typeface="Arial"/>
+              </a:rPr>
+              <a:t>H</a:t>
+            </a:r>
+            <a:endParaRPr kumimoji="1" lang="zh-TW" altLang="en-US" i="1" baseline="-25000" dirty="0">
+              <a:latin typeface="Arial"/>
+              <a:cs typeface="Arial"/>
+            </a:endParaRPr>
+          </a:p>
+        </p:txBody>
+      </p:sp>
+    </p:spTree>
+    <p:extLst>
+      <p:ext uri="{BB962C8B-B14F-4D97-AF65-F5344CB8AC3E}">
+        <p14:creationId xmlns:p14="http://schemas.microsoft.com/office/powerpoint/2010/main" val="2628635086"/>
       </p:ext>
     </p:extLst>
   </p:cSld>

</xml_diff>

<commit_message>
Citations included. Evaluation 2 tables undone...
</commit_message>
<xml_diff>
--- a/cw ismir2014/cw_ismir2014_plots.pptx
+++ b/cw ismir2014/cw_ismir2014_plots.pptx
@@ -295,7 +295,7 @@
           <a:p>
             <a:fld id="{8A0EEBEE-491D-0547-AD30-3CFBCD2A91CE}" type="datetimeFigureOut">
               <a:rPr kumimoji="1" lang="zh-TW" altLang="en-US" smtClean="0"/>
-              <a:t>4/23/14</a:t>
+              <a:t>4/25/14</a:t>
             </a:fld>
             <a:endParaRPr kumimoji="1" lang="zh-TW" altLang="en-US"/>
           </a:p>
@@ -465,7 +465,7 @@
           <a:p>
             <a:fld id="{8A0EEBEE-491D-0547-AD30-3CFBCD2A91CE}" type="datetimeFigureOut">
               <a:rPr kumimoji="1" lang="zh-TW" altLang="en-US" smtClean="0"/>
-              <a:t>4/23/14</a:t>
+              <a:t>4/25/14</a:t>
             </a:fld>
             <a:endParaRPr kumimoji="1" lang="zh-TW" altLang="en-US"/>
           </a:p>
@@ -645,7 +645,7 @@
           <a:p>
             <a:fld id="{8A0EEBEE-491D-0547-AD30-3CFBCD2A91CE}" type="datetimeFigureOut">
               <a:rPr kumimoji="1" lang="zh-TW" altLang="en-US" smtClean="0"/>
-              <a:t>4/23/14</a:t>
+              <a:t>4/25/14</a:t>
             </a:fld>
             <a:endParaRPr kumimoji="1" lang="zh-TW" altLang="en-US"/>
           </a:p>
@@ -815,7 +815,7 @@
           <a:p>
             <a:fld id="{8A0EEBEE-491D-0547-AD30-3CFBCD2A91CE}" type="datetimeFigureOut">
               <a:rPr kumimoji="1" lang="zh-TW" altLang="en-US" smtClean="0"/>
-              <a:t>4/23/14</a:t>
+              <a:t>4/25/14</a:t>
             </a:fld>
             <a:endParaRPr kumimoji="1" lang="zh-TW" altLang="en-US"/>
           </a:p>
@@ -1061,7 +1061,7 @@
           <a:p>
             <a:fld id="{8A0EEBEE-491D-0547-AD30-3CFBCD2A91CE}" type="datetimeFigureOut">
               <a:rPr kumimoji="1" lang="zh-TW" altLang="en-US" smtClean="0"/>
-              <a:t>4/23/14</a:t>
+              <a:t>4/25/14</a:t>
             </a:fld>
             <a:endParaRPr kumimoji="1" lang="zh-TW" altLang="en-US"/>
           </a:p>
@@ -1349,7 +1349,7 @@
           <a:p>
             <a:fld id="{8A0EEBEE-491D-0547-AD30-3CFBCD2A91CE}" type="datetimeFigureOut">
               <a:rPr kumimoji="1" lang="zh-TW" altLang="en-US" smtClean="0"/>
-              <a:t>4/23/14</a:t>
+              <a:t>4/25/14</a:t>
             </a:fld>
             <a:endParaRPr kumimoji="1" lang="zh-TW" altLang="en-US"/>
           </a:p>
@@ -1771,7 +1771,7 @@
           <a:p>
             <a:fld id="{8A0EEBEE-491D-0547-AD30-3CFBCD2A91CE}" type="datetimeFigureOut">
               <a:rPr kumimoji="1" lang="zh-TW" altLang="en-US" smtClean="0"/>
-              <a:t>4/23/14</a:t>
+              <a:t>4/25/14</a:t>
             </a:fld>
             <a:endParaRPr kumimoji="1" lang="zh-TW" altLang="en-US"/>
           </a:p>
@@ -1889,7 +1889,7 @@
           <a:p>
             <a:fld id="{8A0EEBEE-491D-0547-AD30-3CFBCD2A91CE}" type="datetimeFigureOut">
               <a:rPr kumimoji="1" lang="zh-TW" altLang="en-US" smtClean="0"/>
-              <a:t>4/23/14</a:t>
+              <a:t>4/25/14</a:t>
             </a:fld>
             <a:endParaRPr kumimoji="1" lang="zh-TW" altLang="en-US"/>
           </a:p>
@@ -1984,7 +1984,7 @@
           <a:p>
             <a:fld id="{8A0EEBEE-491D-0547-AD30-3CFBCD2A91CE}" type="datetimeFigureOut">
               <a:rPr kumimoji="1" lang="zh-TW" altLang="en-US" smtClean="0"/>
-              <a:t>4/23/14</a:t>
+              <a:t>4/25/14</a:t>
             </a:fld>
             <a:endParaRPr kumimoji="1" lang="zh-TW" altLang="en-US"/>
           </a:p>
@@ -2261,7 +2261,7 @@
           <a:p>
             <a:fld id="{8A0EEBEE-491D-0547-AD30-3CFBCD2A91CE}" type="datetimeFigureOut">
               <a:rPr kumimoji="1" lang="zh-TW" altLang="en-US" smtClean="0"/>
-              <a:t>4/23/14</a:t>
+              <a:t>4/25/14</a:t>
             </a:fld>
             <a:endParaRPr kumimoji="1" lang="zh-TW" altLang="en-US"/>
           </a:p>
@@ -2514,7 +2514,7 @@
           <a:p>
             <a:fld id="{8A0EEBEE-491D-0547-AD30-3CFBCD2A91CE}" type="datetimeFigureOut">
               <a:rPr kumimoji="1" lang="zh-TW" altLang="en-US" smtClean="0"/>
-              <a:t>4/23/14</a:t>
+              <a:t>4/25/14</a:t>
             </a:fld>
             <a:endParaRPr kumimoji="1" lang="zh-TW" altLang="en-US"/>
           </a:p>
@@ -2727,7 +2727,7 @@
           <a:p>
             <a:fld id="{8A0EEBEE-491D-0547-AD30-3CFBCD2A91CE}" type="datetimeFigureOut">
               <a:rPr kumimoji="1" lang="zh-TW" altLang="en-US" smtClean="0"/>
-              <a:t>4/23/14</a:t>
+              <a:t>4/25/14</a:t>
             </a:fld>
             <a:endParaRPr kumimoji="1" lang="zh-TW" altLang="en-US"/>
           </a:p>
@@ -6249,7 +6249,7 @@
         <p:spPr>
           <a:xfrm>
             <a:off x="1963561" y="1996642"/>
-            <a:ext cx="402749" cy="369332"/>
+            <a:ext cx="400806" cy="369332"/>
           </a:xfrm>
           <a:prstGeom prst="rect">
             <a:avLst/>
@@ -6263,11 +6263,11 @@
           <a:lstStyle/>
           <a:p>
             <a:r>
-              <a:rPr kumimoji="1" lang="en-US" altLang="zh-TW" i="1" dirty="0" smtClean="0">
+              <a:rPr kumimoji="1" lang="en-US" altLang="zh-TW" i="1" dirty="0">
                 <a:latin typeface="Arial"/>
                 <a:cs typeface="Arial"/>
               </a:rPr>
-              <a:t>X</a:t>
+              <a:t>V</a:t>
             </a:r>
             <a:endParaRPr kumimoji="1" lang="zh-TW" altLang="en-US" i="1" dirty="0">
               <a:latin typeface="Arial"/>

</xml_diff>